<commit_message>
correction 1 erreur W3C index + modification nom index_opti en index
</commit_message>
<xml_diff>
--- a/annexe/rapport_optimisation_SEO_aymeric_sandoz.pptx
+++ b/annexe/rapport_optimisation_SEO_aymeric_sandoz.pptx
@@ -10,10 +10,10 @@
   <p:sldIdLst>
     <p:sldId id="256" r:id="rId2"/>
     <p:sldId id="257" r:id="rId3"/>
-    <p:sldId id="261" r:id="rId4"/>
-    <p:sldId id="259" r:id="rId5"/>
-    <p:sldId id="262" r:id="rId6"/>
-    <p:sldId id="260" r:id="rId7"/>
+    <p:sldId id="271" r:id="rId4"/>
+    <p:sldId id="261" r:id="rId5"/>
+    <p:sldId id="259" r:id="rId6"/>
+    <p:sldId id="262" r:id="rId7"/>
     <p:sldId id="263" r:id="rId8"/>
     <p:sldId id="264" r:id="rId9"/>
     <p:sldId id="265" r:id="rId10"/>
@@ -5972,7 +5972,7 @@
             <p:ph idx="1"/>
             <p:extLst>
               <p:ext uri="{D42A27DB-BD31-4B8C-83A1-F6EECF244321}">
-                <p14:modId xmlns:p14="http://schemas.microsoft.com/office/powerpoint/2010/main" val="3010151988"/>
+                <p14:modId xmlns:p14="http://schemas.microsoft.com/office/powerpoint/2010/main" val="2866611114"/>
               </p:ext>
             </p:extLst>
           </p:nvPr>
@@ -6205,7 +6205,19 @@
                           <a:ea typeface="+mn-ea"/>
                           <a:cs typeface="+mn-cs"/>
                         </a:rPr>
-                        <a:t> permet d’inciter au clic.</a:t>
+                        <a:t> permet d’inciter </a:t>
+                      </a:r>
+                      <a:r>
+                        <a:rPr lang="fr-FR" sz="1800" b="0" i="0" kern="1200" dirty="0" smtClean="0">
+                          <a:solidFill>
+                            <a:schemeClr val="dk1"/>
+                          </a:solidFill>
+                          <a:effectLst/>
+                          <a:latin typeface="+mn-lt"/>
+                          <a:ea typeface="+mn-ea"/>
+                          <a:cs typeface="+mn-cs"/>
+                        </a:rPr>
+                        <a:t>les utilisateurs à explorer votre site.</a:t>
                       </a:r>
                       <a:endParaRPr lang="fr-FR" dirty="0"/>
                     </a:p>
@@ -6356,8 +6368,20 @@
           <a:p>
             <a:pPr algn="ctr"/>
             <a:r>
-              <a:rPr lang="fr-FR" b="1" dirty="0" err="1" smtClean="0"/>
-              <a:t>Language</a:t>
+              <a:rPr lang="fr-FR" dirty="0" smtClean="0"/>
+              <a:t>Fichier </a:t>
+            </a:r>
+            <a:r>
+              <a:rPr lang="fr-FR" b="1" dirty="0" smtClean="0"/>
+              <a:t>CSS</a:t>
+            </a:r>
+            <a:r>
+              <a:rPr lang="fr-FR" dirty="0" smtClean="0"/>
+              <a:t> et </a:t>
+            </a:r>
+            <a:r>
+              <a:rPr lang="fr-FR" b="1" dirty="0" smtClean="0"/>
+              <a:t>JS</a:t>
             </a:r>
             <a:endParaRPr lang="fr-FR" b="1" dirty="0"/>
           </a:p>
@@ -6404,6 +6428,671 @@
             <a:fld id="{92ECF272-8E12-4056-A1BB-D9C81DD1199A}" type="slidenum">
               <a:rPr lang="fr-FR" smtClean="0"/>
               <a:t>3</a:t>
+            </a:fld>
+            <a:endParaRPr lang="fr-FR"/>
+          </a:p>
+        </p:txBody>
+      </p:sp>
+      <p:graphicFrame>
+        <p:nvGraphicFramePr>
+          <p:cNvPr id="8" name="Espace réservé du contenu 7"/>
+          <p:cNvGraphicFramePr>
+            <a:graphicFrameLocks noGrp="1"/>
+          </p:cNvGraphicFramePr>
+          <p:nvPr>
+            <p:ph idx="1"/>
+            <p:extLst/>
+          </p:nvPr>
+        </p:nvGraphicFramePr>
+        <p:xfrm>
+          <a:off x="1096963" y="1846263"/>
+          <a:ext cx="10058400" cy="3666263"/>
+        </p:xfrm>
+        <a:graphic>
+          <a:graphicData uri="http://schemas.openxmlformats.org/drawingml/2006/table">
+            <a:tbl>
+              <a:tblPr firstRow="1" bandRow="1">
+                <a:tableStyleId>{5C22544A-7EE6-4342-B048-85BDC9FD1C3A}</a:tableStyleId>
+              </a:tblPr>
+              <a:tblGrid>
+                <a:gridCol w="5029200">
+                  <a:extLst>
+                    <a:ext uri="{9D8B030D-6E8A-4147-A177-3AD203B41FA5}">
+                      <a16:colId xmlns:a16="http://schemas.microsoft.com/office/drawing/2014/main" val="3903002809"/>
+                    </a:ext>
+                  </a:extLst>
+                </a:gridCol>
+                <a:gridCol w="5029200">
+                  <a:extLst>
+                    <a:ext uri="{9D8B030D-6E8A-4147-A177-3AD203B41FA5}">
+                      <a16:colId xmlns:a16="http://schemas.microsoft.com/office/drawing/2014/main" val="940473770"/>
+                    </a:ext>
+                  </a:extLst>
+                </a:gridCol>
+              </a:tblGrid>
+              <a:tr h="557303">
+                <a:tc>
+                  <a:txBody>
+                    <a:bodyPr/>
+                    <a:lstStyle/>
+                    <a:p>
+                      <a:pPr algn="ctr"/>
+                      <a:r>
+                        <a:rPr lang="fr-FR" dirty="0" smtClean="0">
+                          <a:solidFill>
+                            <a:schemeClr val="tx1"/>
+                          </a:solidFill>
+                          <a:latin typeface="Arial" panose="020B0604020202020204" pitchFamily="34" charset="0"/>
+                          <a:cs typeface="Arial" panose="020B0604020202020204" pitchFamily="34" charset="0"/>
+                        </a:rPr>
+                        <a:t> Problème</a:t>
+                      </a:r>
+                      <a:endParaRPr lang="fr-FR" dirty="0">
+                        <a:solidFill>
+                          <a:schemeClr val="tx1"/>
+                        </a:solidFill>
+                        <a:latin typeface="Arial" panose="020B0604020202020204" pitchFamily="34" charset="0"/>
+                        <a:cs typeface="Arial" panose="020B0604020202020204" pitchFamily="34" charset="0"/>
+                      </a:endParaRPr>
+                    </a:p>
+                  </a:txBody>
+                  <a:tcPr>
+                    <a:solidFill>
+                      <a:srgbClr val="BD582C"/>
+                    </a:solidFill>
+                  </a:tcPr>
+                </a:tc>
+                <a:tc>
+                  <a:txBody>
+                    <a:bodyPr/>
+                    <a:lstStyle/>
+                    <a:p>
+                      <a:pPr algn="ctr"/>
+                      <a:r>
+                        <a:rPr lang="fr-FR" dirty="0" smtClean="0">
+                          <a:solidFill>
+                            <a:schemeClr val="tx1"/>
+                          </a:solidFill>
+                          <a:latin typeface="Arial" panose="020B0604020202020204" pitchFamily="34" charset="0"/>
+                          <a:cs typeface="Arial" panose="020B0604020202020204" pitchFamily="34" charset="0"/>
+                        </a:rPr>
+                        <a:t>Recommandation</a:t>
+                      </a:r>
+                      <a:endParaRPr lang="fr-FR" dirty="0">
+                        <a:solidFill>
+                          <a:schemeClr val="tx1"/>
+                        </a:solidFill>
+                        <a:latin typeface="Arial" panose="020B0604020202020204" pitchFamily="34" charset="0"/>
+                        <a:cs typeface="Arial" panose="020B0604020202020204" pitchFamily="34" charset="0"/>
+                      </a:endParaRPr>
+                    </a:p>
+                  </a:txBody>
+                  <a:tcPr>
+                    <a:solidFill>
+                      <a:srgbClr val="BD582C"/>
+                    </a:solidFill>
+                  </a:tcPr>
+                </a:tc>
+                <a:extLst>
+                  <a:ext uri="{0D108BD9-81ED-4DB2-BD59-A6C34878D82A}">
+                    <a16:rowId xmlns:a16="http://schemas.microsoft.com/office/drawing/2014/main" val="3393620262"/>
+                  </a:ext>
+                </a:extLst>
+              </a:tr>
+              <a:tr h="2061731">
+                <a:tc>
+                  <a:txBody>
+                    <a:bodyPr/>
+                    <a:lstStyle/>
+                    <a:p>
+                      <a:pPr marL="285750" indent="-285750" algn="l">
+                        <a:buFont typeface="Wingdings" panose="05000000000000000000" pitchFamily="2" charset="2"/>
+                        <a:buChar char="q"/>
+                      </a:pPr>
+                      <a:r>
+                        <a:rPr lang="fr-FR" sz="1800" b="0" i="0" kern="1200" dirty="0" smtClean="0">
+                          <a:solidFill>
+                            <a:schemeClr val="dk1"/>
+                          </a:solidFill>
+                          <a:effectLst/>
+                          <a:latin typeface="+mn-lt"/>
+                          <a:ea typeface="+mn-ea"/>
+                          <a:cs typeface="+mn-cs"/>
+                        </a:rPr>
+                        <a:t>Les </a:t>
+                      </a:r>
+                      <a:r>
+                        <a:rPr lang="fr-FR" sz="1800" b="1" i="0" kern="1200" dirty="0" smtClean="0">
+                          <a:solidFill>
+                            <a:schemeClr val="dk1"/>
+                          </a:solidFill>
+                          <a:effectLst/>
+                          <a:latin typeface="+mn-lt"/>
+                          <a:ea typeface="+mn-ea"/>
+                          <a:cs typeface="+mn-cs"/>
+                        </a:rPr>
+                        <a:t>robots</a:t>
+                      </a:r>
+                      <a:r>
+                        <a:rPr lang="fr-FR" sz="1800" b="0" i="0" kern="1200" dirty="0" smtClean="0">
+                          <a:solidFill>
+                            <a:schemeClr val="dk1"/>
+                          </a:solidFill>
+                          <a:effectLst/>
+                          <a:latin typeface="+mn-lt"/>
+                          <a:ea typeface="+mn-ea"/>
+                          <a:cs typeface="+mn-cs"/>
+                        </a:rPr>
+                        <a:t> prennent trop de temps à lire les fichiers CSS et JAVASCRIPTS.</a:t>
+                      </a:r>
+                    </a:p>
+                    <a:p>
+                      <a:pPr marL="285750" indent="-285750" algn="l">
+                        <a:buFont typeface="Wingdings" panose="05000000000000000000" pitchFamily="2" charset="2"/>
+                        <a:buChar char="q"/>
+                      </a:pPr>
+                      <a:endParaRPr lang="fr-FR" sz="1800" b="0" i="0" kern="1200" dirty="0" smtClean="0">
+                        <a:solidFill>
+                          <a:schemeClr val="dk1"/>
+                        </a:solidFill>
+                        <a:effectLst/>
+                        <a:latin typeface="+mn-lt"/>
+                        <a:ea typeface="+mn-ea"/>
+                        <a:cs typeface="+mn-cs"/>
+                      </a:endParaRPr>
+                    </a:p>
+                    <a:p>
+                      <a:pPr marL="285750" indent="-285750" algn="l">
+                        <a:buFont typeface="Wingdings" panose="05000000000000000000" pitchFamily="2" charset="2"/>
+                        <a:buChar char="q"/>
+                      </a:pPr>
+                      <a:r>
+                        <a:rPr lang="fr-FR" sz="1800" b="0" i="0" kern="1200" dirty="0" smtClean="0">
+                          <a:solidFill>
+                            <a:schemeClr val="dk1"/>
+                          </a:solidFill>
+                          <a:effectLst/>
+                          <a:latin typeface="+mn-lt"/>
+                          <a:ea typeface="+mn-ea"/>
+                          <a:cs typeface="+mn-cs"/>
+                        </a:rPr>
+                        <a:t>Néfaste</a:t>
+                      </a:r>
+                      <a:r>
+                        <a:rPr lang="fr-FR" sz="1800" b="0" i="0" kern="1200" baseline="0" dirty="0" smtClean="0">
+                          <a:solidFill>
+                            <a:schemeClr val="dk1"/>
+                          </a:solidFill>
+                          <a:effectLst/>
+                          <a:latin typeface="+mn-lt"/>
+                          <a:ea typeface="+mn-ea"/>
+                          <a:cs typeface="+mn-cs"/>
+                        </a:rPr>
+                        <a:t> pour </a:t>
+                      </a:r>
+                      <a:r>
+                        <a:rPr lang="fr-FR" sz="1800" b="1" i="0" kern="1200" baseline="0" dirty="0" smtClean="0">
+                          <a:solidFill>
+                            <a:schemeClr val="dk1"/>
+                          </a:solidFill>
+                          <a:effectLst/>
+                          <a:latin typeface="+mn-lt"/>
+                          <a:ea typeface="+mn-ea"/>
+                          <a:cs typeface="+mn-cs"/>
+                        </a:rPr>
+                        <a:t>l’expérience utilisateur </a:t>
+                      </a:r>
+                      <a:r>
+                        <a:rPr lang="fr-FR" sz="1800" b="0" i="0" kern="1200" baseline="0" dirty="0" smtClean="0">
+                          <a:solidFill>
+                            <a:schemeClr val="dk1"/>
+                          </a:solidFill>
+                          <a:effectLst/>
+                          <a:latin typeface="+mn-lt"/>
+                          <a:ea typeface="+mn-ea"/>
+                          <a:cs typeface="+mn-cs"/>
+                        </a:rPr>
+                        <a:t>et pour le </a:t>
+                      </a:r>
+                      <a:r>
+                        <a:rPr lang="fr-FR" sz="1800" b="1" i="0" kern="1200" baseline="0" dirty="0" smtClean="0">
+                          <a:solidFill>
+                            <a:schemeClr val="dk1"/>
+                          </a:solidFill>
+                          <a:effectLst/>
+                          <a:latin typeface="+mn-lt"/>
+                          <a:ea typeface="+mn-ea"/>
+                          <a:cs typeface="+mn-cs"/>
+                        </a:rPr>
+                        <a:t>référencement SEO. </a:t>
+                      </a:r>
+                      <a:endParaRPr lang="fr-FR" sz="1800" b="1" i="0" kern="1200" dirty="0" smtClean="0">
+                        <a:solidFill>
+                          <a:schemeClr val="dk1"/>
+                        </a:solidFill>
+                        <a:effectLst/>
+                        <a:latin typeface="+mn-lt"/>
+                        <a:ea typeface="+mn-ea"/>
+                        <a:cs typeface="+mn-cs"/>
+                      </a:endParaRPr>
+                    </a:p>
+                    <a:p>
+                      <a:pPr marL="285750" indent="-285750" algn="l">
+                        <a:buFont typeface="Wingdings" panose="05000000000000000000" pitchFamily="2" charset="2"/>
+                        <a:buChar char="q"/>
+                      </a:pPr>
+                      <a:endParaRPr lang="fr-FR" sz="1800" b="0" i="0" kern="1200" dirty="0" smtClean="0">
+                        <a:solidFill>
+                          <a:schemeClr val="dk1"/>
+                        </a:solidFill>
+                        <a:effectLst/>
+                        <a:latin typeface="+mn-lt"/>
+                        <a:ea typeface="+mn-ea"/>
+                        <a:cs typeface="+mn-cs"/>
+                      </a:endParaRPr>
+                    </a:p>
+                    <a:p>
+                      <a:pPr marL="285750" indent="-285750" algn="l">
+                        <a:buFont typeface="Wingdings" panose="05000000000000000000" pitchFamily="2" charset="2"/>
+                        <a:buChar char="q"/>
+                      </a:pPr>
+                      <a:endParaRPr lang="fr-FR" sz="1800" b="0" i="0" kern="1200" dirty="0" smtClean="0">
+                        <a:solidFill>
+                          <a:schemeClr val="dk1"/>
+                        </a:solidFill>
+                        <a:effectLst/>
+                        <a:latin typeface="+mn-lt"/>
+                        <a:ea typeface="+mn-ea"/>
+                        <a:cs typeface="+mn-cs"/>
+                      </a:endParaRPr>
+                    </a:p>
+                    <a:p>
+                      <a:pPr marL="285750" indent="-285750" algn="l">
+                        <a:buFont typeface="Wingdings" panose="05000000000000000000" pitchFamily="2" charset="2"/>
+                        <a:buChar char="q"/>
+                      </a:pPr>
+                      <a:endParaRPr lang="fr-FR" dirty="0"/>
+                    </a:p>
+                  </a:txBody>
+                  <a:tcPr>
+                    <a:solidFill>
+                      <a:schemeClr val="accent3">
+                        <a:lumMod val="20000"/>
+                        <a:lumOff val="80000"/>
+                      </a:schemeClr>
+                    </a:solidFill>
+                  </a:tcPr>
+                </a:tc>
+                <a:tc>
+                  <a:txBody>
+                    <a:bodyPr/>
+                    <a:lstStyle/>
+                    <a:p>
+                      <a:pPr marL="285750" indent="-285750" algn="l">
+                        <a:buFont typeface="Wingdings" panose="05000000000000000000" pitchFamily="2" charset="2"/>
+                        <a:buChar char="q"/>
+                      </a:pPr>
+                      <a:r>
+                        <a:rPr lang="fr-FR" sz="1800" b="1" i="0" kern="1200" dirty="0" err="1" smtClean="0">
+                          <a:solidFill>
+                            <a:schemeClr val="dk1"/>
+                          </a:solidFill>
+                          <a:effectLst/>
+                          <a:latin typeface="+mn-lt"/>
+                          <a:ea typeface="+mn-ea"/>
+                          <a:cs typeface="+mn-cs"/>
+                        </a:rPr>
+                        <a:t>Minifier</a:t>
+                      </a:r>
+                      <a:r>
+                        <a:rPr lang="fr-FR" sz="1800" b="0" i="0" kern="1200" dirty="0" smtClean="0">
+                          <a:solidFill>
+                            <a:schemeClr val="dk1"/>
+                          </a:solidFill>
+                          <a:effectLst/>
+                          <a:latin typeface="+mn-lt"/>
+                          <a:ea typeface="+mn-ea"/>
+                          <a:cs typeface="+mn-cs"/>
+                        </a:rPr>
+                        <a:t> son</a:t>
+                      </a:r>
+                      <a:r>
+                        <a:rPr lang="fr-FR" sz="1800" b="0" i="0" kern="1200" baseline="0" dirty="0" smtClean="0">
+                          <a:solidFill>
+                            <a:schemeClr val="dk1"/>
+                          </a:solidFill>
+                          <a:effectLst/>
+                          <a:latin typeface="+mn-lt"/>
+                          <a:ea typeface="+mn-ea"/>
+                          <a:cs typeface="+mn-cs"/>
+                        </a:rPr>
+                        <a:t> code CSS et JS à l’aide de certains sites comme Minify.org.</a:t>
+                      </a:r>
+                      <a:endParaRPr lang="fr-FR" sz="1800" b="0" i="0" kern="1200" dirty="0" smtClean="0">
+                        <a:solidFill>
+                          <a:schemeClr val="dk1"/>
+                        </a:solidFill>
+                        <a:effectLst/>
+                        <a:latin typeface="+mn-lt"/>
+                        <a:ea typeface="+mn-ea"/>
+                        <a:cs typeface="+mn-cs"/>
+                      </a:endParaRPr>
+                    </a:p>
+                    <a:p>
+                      <a:pPr marL="285750" indent="-285750" algn="l">
+                        <a:buFont typeface="Wingdings" panose="05000000000000000000" pitchFamily="2" charset="2"/>
+                        <a:buChar char="q"/>
+                      </a:pPr>
+                      <a:endParaRPr lang="fr-FR" sz="1800" b="0" i="0" kern="1200" dirty="0" smtClean="0">
+                        <a:solidFill>
+                          <a:schemeClr val="dk1"/>
+                        </a:solidFill>
+                        <a:effectLst/>
+                        <a:latin typeface="+mn-lt"/>
+                        <a:ea typeface="+mn-ea"/>
+                        <a:cs typeface="+mn-cs"/>
+                      </a:endParaRPr>
+                    </a:p>
+                    <a:p>
+                      <a:pPr marL="285750" indent="-285750" algn="l">
+                        <a:buFont typeface="Wingdings" panose="05000000000000000000" pitchFamily="2" charset="2"/>
+                        <a:buChar char="q"/>
+                      </a:pPr>
+                      <a:r>
+                        <a:rPr lang="fr-FR" sz="1800" b="1" i="0" kern="1200" dirty="0" smtClean="0">
+                          <a:solidFill>
+                            <a:schemeClr val="dk1"/>
+                          </a:solidFill>
+                          <a:effectLst/>
+                          <a:latin typeface="+mn-lt"/>
+                          <a:ea typeface="+mn-ea"/>
+                          <a:cs typeface="+mn-cs"/>
+                        </a:rPr>
+                        <a:t>Compresser</a:t>
+                      </a:r>
+                      <a:r>
+                        <a:rPr lang="fr-FR" sz="1800" b="0" i="0" kern="1200" baseline="0" dirty="0" smtClean="0">
+                          <a:solidFill>
+                            <a:schemeClr val="dk1"/>
+                          </a:solidFill>
+                          <a:effectLst/>
+                          <a:latin typeface="+mn-lt"/>
+                          <a:ea typeface="+mn-ea"/>
+                          <a:cs typeface="+mn-cs"/>
+                        </a:rPr>
+                        <a:t> son code à l’aide d’un fichier .</a:t>
+                      </a:r>
+                      <a:r>
+                        <a:rPr lang="fr-FR" sz="1800" b="1" i="0" kern="1200" baseline="0" dirty="0" err="1" smtClean="0">
+                          <a:solidFill>
+                            <a:schemeClr val="dk1"/>
+                          </a:solidFill>
+                          <a:effectLst/>
+                          <a:latin typeface="+mn-lt"/>
+                          <a:ea typeface="+mn-ea"/>
+                          <a:cs typeface="+mn-cs"/>
+                        </a:rPr>
+                        <a:t>htacces</a:t>
+                      </a:r>
+                      <a:r>
+                        <a:rPr lang="fr-FR" sz="1800" b="0" i="0" kern="1200" baseline="0" dirty="0" smtClean="0">
+                          <a:solidFill>
+                            <a:schemeClr val="dk1"/>
+                          </a:solidFill>
+                          <a:effectLst/>
+                          <a:latin typeface="+mn-lt"/>
+                          <a:ea typeface="+mn-ea"/>
+                          <a:cs typeface="+mn-cs"/>
+                        </a:rPr>
+                        <a:t>. </a:t>
+                      </a:r>
+                    </a:p>
+                    <a:p>
+                      <a:pPr marL="285750" indent="-285750" algn="l">
+                        <a:buFont typeface="Wingdings" panose="05000000000000000000" pitchFamily="2" charset="2"/>
+                        <a:buChar char="q"/>
+                      </a:pPr>
+                      <a:endParaRPr lang="fr-FR" sz="1800" b="0" i="0" kern="1200" baseline="0" dirty="0" smtClean="0">
+                        <a:solidFill>
+                          <a:schemeClr val="dk1"/>
+                        </a:solidFill>
+                        <a:effectLst/>
+                        <a:latin typeface="+mn-lt"/>
+                        <a:ea typeface="+mn-ea"/>
+                        <a:cs typeface="+mn-cs"/>
+                      </a:endParaRPr>
+                    </a:p>
+                    <a:p>
+                      <a:pPr marL="285750" indent="-285750" algn="l">
+                        <a:buFont typeface="Wingdings" panose="05000000000000000000" pitchFamily="2" charset="2"/>
+                        <a:buChar char="q"/>
+                      </a:pPr>
+                      <a:r>
+                        <a:rPr lang="fr-FR" sz="1800" b="0" i="0" kern="1200" baseline="0" dirty="0" smtClean="0">
+                          <a:solidFill>
+                            <a:schemeClr val="dk1"/>
+                          </a:solidFill>
+                          <a:effectLst/>
+                          <a:latin typeface="+mn-lt"/>
+                          <a:ea typeface="+mn-ea"/>
+                          <a:cs typeface="+mn-cs"/>
+                        </a:rPr>
+                        <a:t>Ajoutez l’attribut </a:t>
+                      </a:r>
+                      <a:r>
+                        <a:rPr lang="fr-FR" sz="1800" b="1" i="0" kern="1200" baseline="0" dirty="0" err="1" smtClean="0">
+                          <a:solidFill>
+                            <a:schemeClr val="dk1"/>
+                          </a:solidFill>
+                          <a:effectLst/>
+                          <a:latin typeface="+mn-lt"/>
+                          <a:ea typeface="+mn-ea"/>
+                          <a:cs typeface="+mn-cs"/>
+                        </a:rPr>
+                        <a:t>async</a:t>
+                      </a:r>
+                      <a:r>
+                        <a:rPr lang="fr-FR" sz="1800" b="0" i="0" kern="1200" baseline="0" dirty="0" smtClean="0">
+                          <a:solidFill>
+                            <a:schemeClr val="dk1"/>
+                          </a:solidFill>
+                          <a:effectLst/>
+                          <a:latin typeface="+mn-lt"/>
+                          <a:ea typeface="+mn-ea"/>
+                          <a:cs typeface="+mn-cs"/>
+                        </a:rPr>
+                        <a:t>, qui permet de </a:t>
+                      </a:r>
+                      <a:r>
+                        <a:rPr lang="fr-FR" sz="1800" b="0" i="0" kern="1200" dirty="0" smtClean="0">
+                          <a:solidFill>
+                            <a:schemeClr val="dk1"/>
+                          </a:solidFill>
+                          <a:effectLst/>
+                          <a:latin typeface="+mn-lt"/>
+                          <a:ea typeface="+mn-ea"/>
+                          <a:cs typeface="+mn-cs"/>
+                        </a:rPr>
+                        <a:t>charger et lancer l'interprétation de code JavaScript </a:t>
+                      </a:r>
+                      <a:r>
+                        <a:rPr lang="fr-FR" sz="1800" b="1" i="0" kern="1200" dirty="0" smtClean="0">
+                          <a:solidFill>
+                            <a:schemeClr val="dk1"/>
+                          </a:solidFill>
+                          <a:effectLst/>
+                          <a:latin typeface="+mn-lt"/>
+                          <a:ea typeface="+mn-ea"/>
+                          <a:cs typeface="+mn-cs"/>
+                        </a:rPr>
+                        <a:t>sans bloquer le rendu </a:t>
+                      </a:r>
+                      <a:r>
+                        <a:rPr lang="fr-FR" sz="1800" b="1" i="0" kern="1200" dirty="0" smtClean="0">
+                          <a:solidFill>
+                            <a:schemeClr val="dk1"/>
+                          </a:solidFill>
+                          <a:effectLst/>
+                          <a:latin typeface="+mn-lt"/>
+                          <a:ea typeface="+mn-ea"/>
+                          <a:cs typeface="+mn-cs"/>
+                        </a:rPr>
+                        <a:t>HTML.</a:t>
+                      </a:r>
+                      <a:endParaRPr lang="fr-FR" sz="1800" b="0" i="0" kern="1200" dirty="0" smtClean="0">
+                        <a:solidFill>
+                          <a:schemeClr val="dk1"/>
+                        </a:solidFill>
+                        <a:effectLst/>
+                        <a:latin typeface="+mn-lt"/>
+                        <a:ea typeface="+mn-ea"/>
+                        <a:cs typeface="+mn-cs"/>
+                      </a:endParaRPr>
+                    </a:p>
+                    <a:p>
+                      <a:pPr marL="285750" indent="-285750" algn="l">
+                        <a:buFont typeface="Wingdings" panose="05000000000000000000" pitchFamily="2" charset="2"/>
+                        <a:buChar char="q"/>
+                      </a:pPr>
+                      <a:endParaRPr lang="fr-FR" sz="1800" b="0" i="0" kern="1200" dirty="0" smtClean="0">
+                        <a:solidFill>
+                          <a:schemeClr val="dk1"/>
+                        </a:solidFill>
+                        <a:effectLst/>
+                        <a:latin typeface="+mn-lt"/>
+                        <a:ea typeface="+mn-ea"/>
+                        <a:cs typeface="+mn-cs"/>
+                      </a:endParaRPr>
+                    </a:p>
+                    <a:p>
+                      <a:pPr marL="285750" indent="-285750" algn="l">
+                        <a:buFont typeface="Wingdings" panose="05000000000000000000" pitchFamily="2" charset="2"/>
+                        <a:buChar char="q"/>
+                      </a:pPr>
+                      <a:endParaRPr lang="fr-FR" dirty="0"/>
+                    </a:p>
+                  </a:txBody>
+                  <a:tcPr>
+                    <a:solidFill>
+                      <a:schemeClr val="accent3">
+                        <a:lumMod val="20000"/>
+                        <a:lumOff val="80000"/>
+                      </a:schemeClr>
+                    </a:solidFill>
+                  </a:tcPr>
+                </a:tc>
+                <a:extLst>
+                  <a:ext uri="{0D108BD9-81ED-4DB2-BD59-A6C34878D82A}">
+                    <a16:rowId xmlns:a16="http://schemas.microsoft.com/office/drawing/2014/main" val="3025257156"/>
+                  </a:ext>
+                </a:extLst>
+              </a:tr>
+            </a:tbl>
+          </a:graphicData>
+        </a:graphic>
+      </p:graphicFrame>
+    </p:spTree>
+    <p:extLst>
+      <p:ext uri="{BB962C8B-B14F-4D97-AF65-F5344CB8AC3E}">
+        <p14:creationId xmlns:p14="http://schemas.microsoft.com/office/powerpoint/2010/main" val="4107462859"/>
+      </p:ext>
+    </p:extLst>
+  </p:cSld>
+  <p:clrMapOvr>
+    <a:masterClrMapping/>
+  </p:clrMapOvr>
+  <p:timing>
+    <p:tnLst>
+      <p:par>
+        <p:cTn id="1" dur="indefinite" restart="never" nodeType="tmRoot"/>
+      </p:par>
+    </p:tnLst>
+  </p:timing>
+</p:sld>
+</file>
+
+<file path=ppt/slides/slide4.xml><?xml version="1.0" encoding="utf-8"?>
+<p:sld xmlns:a="http://schemas.openxmlformats.org/drawingml/2006/main" xmlns:r="http://schemas.openxmlformats.org/officeDocument/2006/relationships" xmlns:p="http://schemas.openxmlformats.org/presentationml/2006/main">
+  <p:cSld>
+    <p:spTree>
+      <p:nvGrpSpPr>
+        <p:cNvPr id="1" name=""/>
+        <p:cNvGrpSpPr/>
+        <p:nvPr/>
+      </p:nvGrpSpPr>
+      <p:grpSpPr>
+        <a:xfrm>
+          <a:off x="0" y="0"/>
+          <a:ext cx="0" cy="0"/>
+          <a:chOff x="0" y="0"/>
+          <a:chExt cx="0" cy="0"/>
+        </a:xfrm>
+      </p:grpSpPr>
+      <p:sp>
+        <p:nvSpPr>
+          <p:cNvPr id="2" name="Titre 1"/>
+          <p:cNvSpPr>
+            <a:spLocks noGrp="1"/>
+          </p:cNvSpPr>
+          <p:nvPr>
+            <p:ph type="title"/>
+          </p:nvPr>
+        </p:nvSpPr>
+        <p:spPr/>
+        <p:txBody>
+          <a:bodyPr/>
+          <a:lstStyle/>
+          <a:p>
+            <a:pPr algn="ctr"/>
+            <a:r>
+              <a:rPr lang="fr-FR" b="1" dirty="0" err="1" smtClean="0"/>
+              <a:t>Language</a:t>
+            </a:r>
+            <a:endParaRPr lang="fr-FR" b="1" dirty="0"/>
+          </a:p>
+        </p:txBody>
+      </p:sp>
+      <p:sp>
+        <p:nvSpPr>
+          <p:cNvPr id="4" name="Espace réservé du pied de page 3"/>
+          <p:cNvSpPr>
+            <a:spLocks noGrp="1"/>
+          </p:cNvSpPr>
+          <p:nvPr>
+            <p:ph type="ftr" sz="quarter" idx="11"/>
+          </p:nvPr>
+        </p:nvSpPr>
+        <p:spPr/>
+        <p:txBody>
+          <a:bodyPr/>
+          <a:lstStyle/>
+          <a:p>
+            <a:r>
+              <a:rPr lang="fr-FR" smtClean="0"/>
+              <a:t>Audit-SEO-Aymeric-Sandoz</a:t>
+            </a:r>
+            <a:endParaRPr lang="fr-FR"/>
+          </a:p>
+        </p:txBody>
+      </p:sp>
+      <p:sp>
+        <p:nvSpPr>
+          <p:cNvPr id="5" name="Espace réservé du numéro de diapositive 4"/>
+          <p:cNvSpPr>
+            <a:spLocks noGrp="1"/>
+          </p:cNvSpPr>
+          <p:nvPr>
+            <p:ph type="sldNum" sz="quarter" idx="12"/>
+          </p:nvPr>
+        </p:nvSpPr>
+        <p:spPr/>
+        <p:txBody>
+          <a:bodyPr/>
+          <a:lstStyle/>
+          <a:p>
+            <a:fld id="{92ECF272-8E12-4056-A1BB-D9C81DD1199A}" type="slidenum">
+              <a:rPr lang="fr-FR" smtClean="0"/>
+              <a:t>4</a:t>
             </a:fld>
             <a:endParaRPr lang="fr-FR"/>
           </a:p>
@@ -7046,7 +7735,7 @@
 </p:sld>
 </file>
 
-<file path=ppt/slides/slide4.xml><?xml version="1.0" encoding="utf-8"?>
+<file path=ppt/slides/slide5.xml><?xml version="1.0" encoding="utf-8"?>
 <p:sld xmlns:a="http://schemas.openxmlformats.org/drawingml/2006/main" xmlns:r="http://schemas.openxmlformats.org/officeDocument/2006/relationships" xmlns:p="http://schemas.openxmlformats.org/presentationml/2006/main">
   <p:cSld>
     <p:spTree>
@@ -7126,7 +7815,7 @@
           <a:p>
             <a:fld id="{92ECF272-8E12-4056-A1BB-D9C81DD1199A}" type="slidenum">
               <a:rPr lang="fr-FR" smtClean="0"/>
-              <a:t>4</a:t>
+              <a:t>5</a:t>
             </a:fld>
             <a:endParaRPr lang="fr-FR"/>
           </a:p>
@@ -7612,7 +8301,7 @@
 </p:sld>
 </file>
 
-<file path=ppt/slides/slide5.xml><?xml version="1.0" encoding="utf-8"?>
+<file path=ppt/slides/slide6.xml><?xml version="1.0" encoding="utf-8"?>
 <p:sld xmlns:a="http://schemas.openxmlformats.org/drawingml/2006/main" xmlns:r="http://schemas.openxmlformats.org/officeDocument/2006/relationships" xmlns:p="http://schemas.openxmlformats.org/presentationml/2006/main">
   <p:cSld>
     <p:spTree>
@@ -7697,7 +8386,7 @@
           <a:p>
             <a:fld id="{92ECF272-8E12-4056-A1BB-D9C81DD1199A}" type="slidenum">
               <a:rPr lang="fr-FR" smtClean="0"/>
-              <a:t>5</a:t>
+              <a:t>6</a:t>
             </a:fld>
             <a:endParaRPr lang="fr-FR"/>
           </a:p>
@@ -8212,675 +8901,6 @@
     <p:extLst>
       <p:ext uri="{BB962C8B-B14F-4D97-AF65-F5344CB8AC3E}">
         <p14:creationId xmlns:p14="http://schemas.microsoft.com/office/powerpoint/2010/main" val="655826372"/>
-      </p:ext>
-    </p:extLst>
-  </p:cSld>
-  <p:clrMapOvr>
-    <a:masterClrMapping/>
-  </p:clrMapOvr>
-  <p:timing>
-    <p:tnLst>
-      <p:par>
-        <p:cTn id="1" dur="indefinite" restart="never" nodeType="tmRoot"/>
-      </p:par>
-    </p:tnLst>
-  </p:timing>
-</p:sld>
-</file>
-
-<file path=ppt/slides/slide6.xml><?xml version="1.0" encoding="utf-8"?>
-<p:sld xmlns:a="http://schemas.openxmlformats.org/drawingml/2006/main" xmlns:r="http://schemas.openxmlformats.org/officeDocument/2006/relationships" xmlns:p="http://schemas.openxmlformats.org/presentationml/2006/main">
-  <p:cSld>
-    <p:spTree>
-      <p:nvGrpSpPr>
-        <p:cNvPr id="1" name=""/>
-        <p:cNvGrpSpPr/>
-        <p:nvPr/>
-      </p:nvGrpSpPr>
-      <p:grpSpPr>
-        <a:xfrm>
-          <a:off x="0" y="0"/>
-          <a:ext cx="0" cy="0"/>
-          <a:chOff x="0" y="0"/>
-          <a:chExt cx="0" cy="0"/>
-        </a:xfrm>
-      </p:grpSpPr>
-      <p:sp>
-        <p:nvSpPr>
-          <p:cNvPr id="2" name="Titre 1"/>
-          <p:cNvSpPr>
-            <a:spLocks noGrp="1"/>
-          </p:cNvSpPr>
-          <p:nvPr>
-            <p:ph type="title"/>
-          </p:nvPr>
-        </p:nvSpPr>
-        <p:spPr/>
-        <p:txBody>
-          <a:bodyPr/>
-          <a:lstStyle/>
-          <a:p>
-            <a:pPr algn="ctr"/>
-            <a:r>
-              <a:rPr lang="fr-FR" dirty="0" smtClean="0"/>
-              <a:t>Fichier </a:t>
-            </a:r>
-            <a:r>
-              <a:rPr lang="fr-FR" b="1" dirty="0" smtClean="0"/>
-              <a:t>CSS</a:t>
-            </a:r>
-            <a:r>
-              <a:rPr lang="fr-FR" dirty="0" smtClean="0"/>
-              <a:t> et </a:t>
-            </a:r>
-            <a:r>
-              <a:rPr lang="fr-FR" b="1" dirty="0" smtClean="0"/>
-              <a:t>JS</a:t>
-            </a:r>
-            <a:endParaRPr lang="fr-FR" b="1" dirty="0"/>
-          </a:p>
-        </p:txBody>
-      </p:sp>
-      <p:sp>
-        <p:nvSpPr>
-          <p:cNvPr id="4" name="Espace réservé du pied de page 3"/>
-          <p:cNvSpPr>
-            <a:spLocks noGrp="1"/>
-          </p:cNvSpPr>
-          <p:nvPr>
-            <p:ph type="ftr" sz="quarter" idx="11"/>
-          </p:nvPr>
-        </p:nvSpPr>
-        <p:spPr/>
-        <p:txBody>
-          <a:bodyPr/>
-          <a:lstStyle/>
-          <a:p>
-            <a:r>
-              <a:rPr lang="fr-FR" smtClean="0"/>
-              <a:t>Audit-SEO-Aymeric-Sandoz</a:t>
-            </a:r>
-            <a:endParaRPr lang="fr-FR"/>
-          </a:p>
-        </p:txBody>
-      </p:sp>
-      <p:sp>
-        <p:nvSpPr>
-          <p:cNvPr id="5" name="Espace réservé du numéro de diapositive 4"/>
-          <p:cNvSpPr>
-            <a:spLocks noGrp="1"/>
-          </p:cNvSpPr>
-          <p:nvPr>
-            <p:ph type="sldNum" sz="quarter" idx="12"/>
-          </p:nvPr>
-        </p:nvSpPr>
-        <p:spPr/>
-        <p:txBody>
-          <a:bodyPr/>
-          <a:lstStyle/>
-          <a:p>
-            <a:fld id="{92ECF272-8E12-4056-A1BB-D9C81DD1199A}" type="slidenum">
-              <a:rPr lang="fr-FR" smtClean="0"/>
-              <a:t>6</a:t>
-            </a:fld>
-            <a:endParaRPr lang="fr-FR"/>
-          </a:p>
-        </p:txBody>
-      </p:sp>
-      <p:graphicFrame>
-        <p:nvGraphicFramePr>
-          <p:cNvPr id="8" name="Espace réservé du contenu 7"/>
-          <p:cNvGraphicFramePr>
-            <a:graphicFrameLocks noGrp="1"/>
-          </p:cNvGraphicFramePr>
-          <p:nvPr>
-            <p:ph idx="1"/>
-            <p:extLst>
-              <p:ext uri="{D42A27DB-BD31-4B8C-83A1-F6EECF244321}">
-                <p14:modId xmlns:p14="http://schemas.microsoft.com/office/powerpoint/2010/main" val="300294810"/>
-              </p:ext>
-            </p:extLst>
-          </p:nvPr>
-        </p:nvGraphicFramePr>
-        <p:xfrm>
-          <a:off x="1096963" y="1846263"/>
-          <a:ext cx="10058400" cy="3666263"/>
-        </p:xfrm>
-        <a:graphic>
-          <a:graphicData uri="http://schemas.openxmlformats.org/drawingml/2006/table">
-            <a:tbl>
-              <a:tblPr firstRow="1" bandRow="1">
-                <a:tableStyleId>{5C22544A-7EE6-4342-B048-85BDC9FD1C3A}</a:tableStyleId>
-              </a:tblPr>
-              <a:tblGrid>
-                <a:gridCol w="5029200">
-                  <a:extLst>
-                    <a:ext uri="{9D8B030D-6E8A-4147-A177-3AD203B41FA5}">
-                      <a16:colId xmlns:a16="http://schemas.microsoft.com/office/drawing/2014/main" val="3903002809"/>
-                    </a:ext>
-                  </a:extLst>
-                </a:gridCol>
-                <a:gridCol w="5029200">
-                  <a:extLst>
-                    <a:ext uri="{9D8B030D-6E8A-4147-A177-3AD203B41FA5}">
-                      <a16:colId xmlns:a16="http://schemas.microsoft.com/office/drawing/2014/main" val="940473770"/>
-                    </a:ext>
-                  </a:extLst>
-                </a:gridCol>
-              </a:tblGrid>
-              <a:tr h="557303">
-                <a:tc>
-                  <a:txBody>
-                    <a:bodyPr/>
-                    <a:lstStyle/>
-                    <a:p>
-                      <a:pPr algn="ctr"/>
-                      <a:r>
-                        <a:rPr lang="fr-FR" dirty="0" smtClean="0">
-                          <a:solidFill>
-                            <a:schemeClr val="tx1"/>
-                          </a:solidFill>
-                          <a:latin typeface="Arial" panose="020B0604020202020204" pitchFamily="34" charset="0"/>
-                          <a:cs typeface="Arial" panose="020B0604020202020204" pitchFamily="34" charset="0"/>
-                        </a:rPr>
-                        <a:t> Problème</a:t>
-                      </a:r>
-                      <a:endParaRPr lang="fr-FR" dirty="0">
-                        <a:solidFill>
-                          <a:schemeClr val="tx1"/>
-                        </a:solidFill>
-                        <a:latin typeface="Arial" panose="020B0604020202020204" pitchFamily="34" charset="0"/>
-                        <a:cs typeface="Arial" panose="020B0604020202020204" pitchFamily="34" charset="0"/>
-                      </a:endParaRPr>
-                    </a:p>
-                  </a:txBody>
-                  <a:tcPr>
-                    <a:solidFill>
-                      <a:srgbClr val="BD582C"/>
-                    </a:solidFill>
-                  </a:tcPr>
-                </a:tc>
-                <a:tc>
-                  <a:txBody>
-                    <a:bodyPr/>
-                    <a:lstStyle/>
-                    <a:p>
-                      <a:pPr algn="ctr"/>
-                      <a:r>
-                        <a:rPr lang="fr-FR" dirty="0" smtClean="0">
-                          <a:solidFill>
-                            <a:schemeClr val="tx1"/>
-                          </a:solidFill>
-                          <a:latin typeface="Arial" panose="020B0604020202020204" pitchFamily="34" charset="0"/>
-                          <a:cs typeface="Arial" panose="020B0604020202020204" pitchFamily="34" charset="0"/>
-                        </a:rPr>
-                        <a:t>Recommandation</a:t>
-                      </a:r>
-                      <a:endParaRPr lang="fr-FR" dirty="0">
-                        <a:solidFill>
-                          <a:schemeClr val="tx1"/>
-                        </a:solidFill>
-                        <a:latin typeface="Arial" panose="020B0604020202020204" pitchFamily="34" charset="0"/>
-                        <a:cs typeface="Arial" panose="020B0604020202020204" pitchFamily="34" charset="0"/>
-                      </a:endParaRPr>
-                    </a:p>
-                  </a:txBody>
-                  <a:tcPr>
-                    <a:solidFill>
-                      <a:srgbClr val="BD582C"/>
-                    </a:solidFill>
-                  </a:tcPr>
-                </a:tc>
-                <a:extLst>
-                  <a:ext uri="{0D108BD9-81ED-4DB2-BD59-A6C34878D82A}">
-                    <a16:rowId xmlns:a16="http://schemas.microsoft.com/office/drawing/2014/main" val="3393620262"/>
-                  </a:ext>
-                </a:extLst>
-              </a:tr>
-              <a:tr h="2061731">
-                <a:tc>
-                  <a:txBody>
-                    <a:bodyPr/>
-                    <a:lstStyle/>
-                    <a:p>
-                      <a:pPr marL="285750" indent="-285750" algn="l">
-                        <a:buFont typeface="Wingdings" panose="05000000000000000000" pitchFamily="2" charset="2"/>
-                        <a:buChar char="q"/>
-                      </a:pPr>
-                      <a:r>
-                        <a:rPr lang="fr-FR" sz="1800" b="0" i="0" kern="1200" dirty="0" smtClean="0">
-                          <a:solidFill>
-                            <a:schemeClr val="dk1"/>
-                          </a:solidFill>
-                          <a:effectLst/>
-                          <a:latin typeface="+mn-lt"/>
-                          <a:ea typeface="+mn-ea"/>
-                          <a:cs typeface="+mn-cs"/>
-                        </a:rPr>
-                        <a:t>Les </a:t>
-                      </a:r>
-                      <a:r>
-                        <a:rPr lang="fr-FR" sz="1800" b="1" i="0" kern="1200" dirty="0" smtClean="0">
-                          <a:solidFill>
-                            <a:schemeClr val="dk1"/>
-                          </a:solidFill>
-                          <a:effectLst/>
-                          <a:latin typeface="+mn-lt"/>
-                          <a:ea typeface="+mn-ea"/>
-                          <a:cs typeface="+mn-cs"/>
-                        </a:rPr>
-                        <a:t>robots</a:t>
-                      </a:r>
-                      <a:r>
-                        <a:rPr lang="fr-FR" sz="1800" b="0" i="0" kern="1200" dirty="0" smtClean="0">
-                          <a:solidFill>
-                            <a:schemeClr val="dk1"/>
-                          </a:solidFill>
-                          <a:effectLst/>
-                          <a:latin typeface="+mn-lt"/>
-                          <a:ea typeface="+mn-ea"/>
-                          <a:cs typeface="+mn-cs"/>
-                        </a:rPr>
-                        <a:t> prennent trop de temps à lire les fichiers CSS et JAVASCRIPTS.</a:t>
-                      </a:r>
-                    </a:p>
-                    <a:p>
-                      <a:pPr marL="285750" indent="-285750" algn="l">
-                        <a:buFont typeface="Wingdings" panose="05000000000000000000" pitchFamily="2" charset="2"/>
-                        <a:buChar char="q"/>
-                      </a:pPr>
-                      <a:endParaRPr lang="fr-FR" sz="1800" b="0" i="0" kern="1200" dirty="0" smtClean="0">
-                        <a:solidFill>
-                          <a:schemeClr val="dk1"/>
-                        </a:solidFill>
-                        <a:effectLst/>
-                        <a:latin typeface="+mn-lt"/>
-                        <a:ea typeface="+mn-ea"/>
-                        <a:cs typeface="+mn-cs"/>
-                      </a:endParaRPr>
-                    </a:p>
-                    <a:p>
-                      <a:pPr marL="285750" indent="-285750" algn="l">
-                        <a:buFont typeface="Wingdings" panose="05000000000000000000" pitchFamily="2" charset="2"/>
-                        <a:buChar char="q"/>
-                      </a:pPr>
-                      <a:r>
-                        <a:rPr lang="fr-FR" sz="1800" b="0" i="0" kern="1200" dirty="0" smtClean="0">
-                          <a:solidFill>
-                            <a:schemeClr val="dk1"/>
-                          </a:solidFill>
-                          <a:effectLst/>
-                          <a:latin typeface="+mn-lt"/>
-                          <a:ea typeface="+mn-ea"/>
-                          <a:cs typeface="+mn-cs"/>
-                        </a:rPr>
-                        <a:t>Néfaste</a:t>
-                      </a:r>
-                      <a:r>
-                        <a:rPr lang="fr-FR" sz="1800" b="0" i="0" kern="1200" baseline="0" dirty="0" smtClean="0">
-                          <a:solidFill>
-                            <a:schemeClr val="dk1"/>
-                          </a:solidFill>
-                          <a:effectLst/>
-                          <a:latin typeface="+mn-lt"/>
-                          <a:ea typeface="+mn-ea"/>
-                          <a:cs typeface="+mn-cs"/>
-                        </a:rPr>
-                        <a:t> pour </a:t>
-                      </a:r>
-                      <a:r>
-                        <a:rPr lang="fr-FR" sz="1800" b="1" i="0" kern="1200" baseline="0" dirty="0" smtClean="0">
-                          <a:solidFill>
-                            <a:schemeClr val="dk1"/>
-                          </a:solidFill>
-                          <a:effectLst/>
-                          <a:latin typeface="+mn-lt"/>
-                          <a:ea typeface="+mn-ea"/>
-                          <a:cs typeface="+mn-cs"/>
-                        </a:rPr>
-                        <a:t>l’expérience utilisateur </a:t>
-                      </a:r>
-                      <a:r>
-                        <a:rPr lang="fr-FR" sz="1800" b="0" i="0" kern="1200" baseline="0" dirty="0" smtClean="0">
-                          <a:solidFill>
-                            <a:schemeClr val="dk1"/>
-                          </a:solidFill>
-                          <a:effectLst/>
-                          <a:latin typeface="+mn-lt"/>
-                          <a:ea typeface="+mn-ea"/>
-                          <a:cs typeface="+mn-cs"/>
-                        </a:rPr>
-                        <a:t>et pour le </a:t>
-                      </a:r>
-                      <a:r>
-                        <a:rPr lang="fr-FR" sz="1800" b="1" i="0" kern="1200" baseline="0" dirty="0" smtClean="0">
-                          <a:solidFill>
-                            <a:schemeClr val="dk1"/>
-                          </a:solidFill>
-                          <a:effectLst/>
-                          <a:latin typeface="+mn-lt"/>
-                          <a:ea typeface="+mn-ea"/>
-                          <a:cs typeface="+mn-cs"/>
-                        </a:rPr>
-                        <a:t>référencement SEO. </a:t>
-                      </a:r>
-                      <a:endParaRPr lang="fr-FR" sz="1800" b="1" i="0" kern="1200" dirty="0" smtClean="0">
-                        <a:solidFill>
-                          <a:schemeClr val="dk1"/>
-                        </a:solidFill>
-                        <a:effectLst/>
-                        <a:latin typeface="+mn-lt"/>
-                        <a:ea typeface="+mn-ea"/>
-                        <a:cs typeface="+mn-cs"/>
-                      </a:endParaRPr>
-                    </a:p>
-                    <a:p>
-                      <a:pPr marL="285750" indent="-285750" algn="l">
-                        <a:buFont typeface="Wingdings" panose="05000000000000000000" pitchFamily="2" charset="2"/>
-                        <a:buChar char="q"/>
-                      </a:pPr>
-                      <a:endParaRPr lang="fr-FR" sz="1800" b="0" i="0" kern="1200" dirty="0" smtClean="0">
-                        <a:solidFill>
-                          <a:schemeClr val="dk1"/>
-                        </a:solidFill>
-                        <a:effectLst/>
-                        <a:latin typeface="+mn-lt"/>
-                        <a:ea typeface="+mn-ea"/>
-                        <a:cs typeface="+mn-cs"/>
-                      </a:endParaRPr>
-                    </a:p>
-                    <a:p>
-                      <a:pPr marL="285750" indent="-285750" algn="l">
-                        <a:buFont typeface="Wingdings" panose="05000000000000000000" pitchFamily="2" charset="2"/>
-                        <a:buChar char="q"/>
-                      </a:pPr>
-                      <a:endParaRPr lang="fr-FR" sz="1800" b="0" i="0" kern="1200" dirty="0" smtClean="0">
-                        <a:solidFill>
-                          <a:schemeClr val="dk1"/>
-                        </a:solidFill>
-                        <a:effectLst/>
-                        <a:latin typeface="+mn-lt"/>
-                        <a:ea typeface="+mn-ea"/>
-                        <a:cs typeface="+mn-cs"/>
-                      </a:endParaRPr>
-                    </a:p>
-                    <a:p>
-                      <a:pPr marL="285750" indent="-285750" algn="l">
-                        <a:buFont typeface="Wingdings" panose="05000000000000000000" pitchFamily="2" charset="2"/>
-                        <a:buChar char="q"/>
-                      </a:pPr>
-                      <a:endParaRPr lang="fr-FR" dirty="0"/>
-                    </a:p>
-                  </a:txBody>
-                  <a:tcPr>
-                    <a:solidFill>
-                      <a:schemeClr val="accent3">
-                        <a:lumMod val="20000"/>
-                        <a:lumOff val="80000"/>
-                      </a:schemeClr>
-                    </a:solidFill>
-                  </a:tcPr>
-                </a:tc>
-                <a:tc>
-                  <a:txBody>
-                    <a:bodyPr/>
-                    <a:lstStyle/>
-                    <a:p>
-                      <a:pPr marL="285750" indent="-285750" algn="l">
-                        <a:buFont typeface="Wingdings" panose="05000000000000000000" pitchFamily="2" charset="2"/>
-                        <a:buChar char="q"/>
-                      </a:pPr>
-                      <a:r>
-                        <a:rPr lang="fr-FR" sz="1800" b="1" i="0" kern="1200" dirty="0" err="1" smtClean="0">
-                          <a:solidFill>
-                            <a:schemeClr val="dk1"/>
-                          </a:solidFill>
-                          <a:effectLst/>
-                          <a:latin typeface="+mn-lt"/>
-                          <a:ea typeface="+mn-ea"/>
-                          <a:cs typeface="+mn-cs"/>
-                        </a:rPr>
-                        <a:t>Minifier</a:t>
-                      </a:r>
-                      <a:r>
-                        <a:rPr lang="fr-FR" sz="1800" b="0" i="0" kern="1200" dirty="0" smtClean="0">
-                          <a:solidFill>
-                            <a:schemeClr val="dk1"/>
-                          </a:solidFill>
-                          <a:effectLst/>
-                          <a:latin typeface="+mn-lt"/>
-                          <a:ea typeface="+mn-ea"/>
-                          <a:cs typeface="+mn-cs"/>
-                        </a:rPr>
-                        <a:t> son</a:t>
-                      </a:r>
-                      <a:r>
-                        <a:rPr lang="fr-FR" sz="1800" b="0" i="0" kern="1200" baseline="0" dirty="0" smtClean="0">
-                          <a:solidFill>
-                            <a:schemeClr val="dk1"/>
-                          </a:solidFill>
-                          <a:effectLst/>
-                          <a:latin typeface="+mn-lt"/>
-                          <a:ea typeface="+mn-ea"/>
-                          <a:cs typeface="+mn-cs"/>
-                        </a:rPr>
-                        <a:t> code CSS et JS à l’aide de certains sites comme Minify.org.</a:t>
-                      </a:r>
-                      <a:endParaRPr lang="fr-FR" sz="1800" b="0" i="0" kern="1200" dirty="0" smtClean="0">
-                        <a:solidFill>
-                          <a:schemeClr val="dk1"/>
-                        </a:solidFill>
-                        <a:effectLst/>
-                        <a:latin typeface="+mn-lt"/>
-                        <a:ea typeface="+mn-ea"/>
-                        <a:cs typeface="+mn-cs"/>
-                      </a:endParaRPr>
-                    </a:p>
-                    <a:p>
-                      <a:pPr marL="285750" indent="-285750" algn="l">
-                        <a:buFont typeface="Wingdings" panose="05000000000000000000" pitchFamily="2" charset="2"/>
-                        <a:buChar char="q"/>
-                      </a:pPr>
-                      <a:endParaRPr lang="fr-FR" sz="1800" b="0" i="0" kern="1200" dirty="0" smtClean="0">
-                        <a:solidFill>
-                          <a:schemeClr val="dk1"/>
-                        </a:solidFill>
-                        <a:effectLst/>
-                        <a:latin typeface="+mn-lt"/>
-                        <a:ea typeface="+mn-ea"/>
-                        <a:cs typeface="+mn-cs"/>
-                      </a:endParaRPr>
-                    </a:p>
-                    <a:p>
-                      <a:pPr marL="285750" indent="-285750" algn="l">
-                        <a:buFont typeface="Wingdings" panose="05000000000000000000" pitchFamily="2" charset="2"/>
-                        <a:buChar char="q"/>
-                      </a:pPr>
-                      <a:r>
-                        <a:rPr lang="fr-FR" sz="1800" b="1" i="0" kern="1200" dirty="0" smtClean="0">
-                          <a:solidFill>
-                            <a:schemeClr val="dk1"/>
-                          </a:solidFill>
-                          <a:effectLst/>
-                          <a:latin typeface="+mn-lt"/>
-                          <a:ea typeface="+mn-ea"/>
-                          <a:cs typeface="+mn-cs"/>
-                        </a:rPr>
-                        <a:t>Compresser</a:t>
-                      </a:r>
-                      <a:r>
-                        <a:rPr lang="fr-FR" sz="1800" b="0" i="0" kern="1200" baseline="0" dirty="0" smtClean="0">
-                          <a:solidFill>
-                            <a:schemeClr val="dk1"/>
-                          </a:solidFill>
-                          <a:effectLst/>
-                          <a:latin typeface="+mn-lt"/>
-                          <a:ea typeface="+mn-ea"/>
-                          <a:cs typeface="+mn-cs"/>
-                        </a:rPr>
-                        <a:t> son code à l’aide d’un fichier .</a:t>
-                      </a:r>
-                      <a:r>
-                        <a:rPr lang="fr-FR" sz="1800" b="1" i="0" kern="1200" baseline="0" dirty="0" err="1" smtClean="0">
-                          <a:solidFill>
-                            <a:schemeClr val="dk1"/>
-                          </a:solidFill>
-                          <a:effectLst/>
-                          <a:latin typeface="+mn-lt"/>
-                          <a:ea typeface="+mn-ea"/>
-                          <a:cs typeface="+mn-cs"/>
-                        </a:rPr>
-                        <a:t>htacces</a:t>
-                      </a:r>
-                      <a:r>
-                        <a:rPr lang="fr-FR" sz="1800" b="0" i="0" kern="1200" baseline="0" dirty="0" smtClean="0">
-                          <a:solidFill>
-                            <a:schemeClr val="dk1"/>
-                          </a:solidFill>
-                          <a:effectLst/>
-                          <a:latin typeface="+mn-lt"/>
-                          <a:ea typeface="+mn-ea"/>
-                          <a:cs typeface="+mn-cs"/>
-                        </a:rPr>
-                        <a:t>. </a:t>
-                      </a:r>
-                    </a:p>
-                    <a:p>
-                      <a:pPr marL="285750" indent="-285750" algn="l">
-                        <a:buFont typeface="Wingdings" panose="05000000000000000000" pitchFamily="2" charset="2"/>
-                        <a:buChar char="q"/>
-                      </a:pPr>
-                      <a:endParaRPr lang="fr-FR" sz="1800" b="0" i="0" kern="1200" baseline="0" dirty="0" smtClean="0">
-                        <a:solidFill>
-                          <a:schemeClr val="dk1"/>
-                        </a:solidFill>
-                        <a:effectLst/>
-                        <a:latin typeface="+mn-lt"/>
-                        <a:ea typeface="+mn-ea"/>
-                        <a:cs typeface="+mn-cs"/>
-                      </a:endParaRPr>
-                    </a:p>
-                    <a:p>
-                      <a:pPr marL="285750" indent="-285750" algn="l">
-                        <a:buFont typeface="Wingdings" panose="05000000000000000000" pitchFamily="2" charset="2"/>
-                        <a:buChar char="q"/>
-                      </a:pPr>
-                      <a:r>
-                        <a:rPr lang="fr-FR" sz="1800" b="0" i="0" kern="1200" baseline="0" dirty="0" smtClean="0">
-                          <a:solidFill>
-                            <a:schemeClr val="dk1"/>
-                          </a:solidFill>
-                          <a:effectLst/>
-                          <a:latin typeface="+mn-lt"/>
-                          <a:ea typeface="+mn-ea"/>
-                          <a:cs typeface="+mn-cs"/>
-                        </a:rPr>
-                        <a:t>Ajoutez l’attribut </a:t>
-                      </a:r>
-                      <a:r>
-                        <a:rPr lang="fr-FR" sz="1800" b="1" i="0" kern="1200" baseline="0" dirty="0" err="1" smtClean="0">
-                          <a:solidFill>
-                            <a:schemeClr val="dk1"/>
-                          </a:solidFill>
-                          <a:effectLst/>
-                          <a:latin typeface="+mn-lt"/>
-                          <a:ea typeface="+mn-ea"/>
-                          <a:cs typeface="+mn-cs"/>
-                        </a:rPr>
-                        <a:t>async</a:t>
-                      </a:r>
-                      <a:r>
-                        <a:rPr lang="fr-FR" sz="1800" b="0" i="0" kern="1200" baseline="0" dirty="0" smtClean="0">
-                          <a:solidFill>
-                            <a:schemeClr val="dk1"/>
-                          </a:solidFill>
-                          <a:effectLst/>
-                          <a:latin typeface="+mn-lt"/>
-                          <a:ea typeface="+mn-ea"/>
-                          <a:cs typeface="+mn-cs"/>
-                        </a:rPr>
-                        <a:t>, qui permet de </a:t>
-                      </a:r>
-                      <a:r>
-                        <a:rPr lang="fr-FR" sz="1800" b="0" i="0" kern="1200" dirty="0" smtClean="0">
-                          <a:solidFill>
-                            <a:schemeClr val="dk1"/>
-                          </a:solidFill>
-                          <a:effectLst/>
-                          <a:latin typeface="+mn-lt"/>
-                          <a:ea typeface="+mn-ea"/>
-                          <a:cs typeface="+mn-cs"/>
-                        </a:rPr>
-                        <a:t>charger et lancer l'interprétation de code JavaScript </a:t>
-                      </a:r>
-                      <a:r>
-                        <a:rPr lang="fr-FR" sz="1800" b="1" i="0" kern="1200" dirty="0" smtClean="0">
-                          <a:solidFill>
-                            <a:schemeClr val="dk1"/>
-                          </a:solidFill>
-                          <a:effectLst/>
-                          <a:latin typeface="+mn-lt"/>
-                          <a:ea typeface="+mn-ea"/>
-                          <a:cs typeface="+mn-cs"/>
-                        </a:rPr>
-                        <a:t>sans bloquer le rendu HTML</a:t>
-                      </a:r>
-                      <a:endParaRPr lang="fr-FR" sz="1800" b="0" i="0" kern="1200" dirty="0" smtClean="0">
-                        <a:solidFill>
-                          <a:schemeClr val="dk1"/>
-                        </a:solidFill>
-                        <a:effectLst/>
-                        <a:latin typeface="+mn-lt"/>
-                        <a:ea typeface="+mn-ea"/>
-                        <a:cs typeface="+mn-cs"/>
-                      </a:endParaRPr>
-                    </a:p>
-                    <a:p>
-                      <a:pPr marL="285750" indent="-285750" algn="l">
-                        <a:buFont typeface="Wingdings" panose="05000000000000000000" pitchFamily="2" charset="2"/>
-                        <a:buChar char="q"/>
-                      </a:pPr>
-                      <a:endParaRPr lang="fr-FR" sz="1800" b="0" i="0" kern="1200" dirty="0" smtClean="0">
-                        <a:solidFill>
-                          <a:schemeClr val="dk1"/>
-                        </a:solidFill>
-                        <a:effectLst/>
-                        <a:latin typeface="+mn-lt"/>
-                        <a:ea typeface="+mn-ea"/>
-                        <a:cs typeface="+mn-cs"/>
-                      </a:endParaRPr>
-                    </a:p>
-                    <a:p>
-                      <a:pPr marL="285750" indent="-285750" algn="l">
-                        <a:buFont typeface="Wingdings" panose="05000000000000000000" pitchFamily="2" charset="2"/>
-                        <a:buChar char="q"/>
-                      </a:pPr>
-                      <a:endParaRPr lang="fr-FR" dirty="0"/>
-                    </a:p>
-                  </a:txBody>
-                  <a:tcPr>
-                    <a:solidFill>
-                      <a:schemeClr val="accent3">
-                        <a:lumMod val="20000"/>
-                        <a:lumOff val="80000"/>
-                      </a:schemeClr>
-                    </a:solidFill>
-                  </a:tcPr>
-                </a:tc>
-                <a:extLst>
-                  <a:ext uri="{0D108BD9-81ED-4DB2-BD59-A6C34878D82A}">
-                    <a16:rowId xmlns:a16="http://schemas.microsoft.com/office/drawing/2014/main" val="3025257156"/>
-                  </a:ext>
-                </a:extLst>
-              </a:tr>
-            </a:tbl>
-          </a:graphicData>
-        </a:graphic>
-      </p:graphicFrame>
-    </p:spTree>
-    <p:extLst>
-      <p:ext uri="{BB962C8B-B14F-4D97-AF65-F5344CB8AC3E}">
-        <p14:creationId xmlns:p14="http://schemas.microsoft.com/office/powerpoint/2010/main" val="4265081684"/>
       </p:ext>
     </p:extLst>
   </p:cSld>
@@ -10525,31 +10545,7 @@
                           <a:ea typeface="+mn-ea"/>
                           <a:cs typeface="+mn-cs"/>
                         </a:rPr>
-                        <a:t> </a:t>
-                      </a:r>
-                      <a:r>
-                        <a:rPr lang="fr-FR" sz="1800" b="0" i="0" kern="1200" baseline="0" dirty="0" smtClean="0">
-                          <a:solidFill>
-                            <a:schemeClr val="dk1"/>
-                          </a:solidFill>
-                          <a:effectLst/>
-                          <a:latin typeface="+mn-lt"/>
-                          <a:ea typeface="+mn-ea"/>
-                          <a:cs typeface="+mn-cs"/>
-                        </a:rPr>
-                        <a:t>(Il est conseillé </a:t>
-                      </a:r>
-                      <a:r>
-                        <a:rPr lang="fr-FR" sz="1800" b="0" i="0" kern="1200" baseline="0" dirty="0" smtClean="0">
-                          <a:solidFill>
-                            <a:schemeClr val="dk1"/>
-                          </a:solidFill>
-                          <a:effectLst/>
-                          <a:latin typeface="+mn-lt"/>
-                          <a:ea typeface="+mn-ea"/>
-                          <a:cs typeface="+mn-cs"/>
-                        </a:rPr>
-                        <a:t>d’y ajouter un mot-clé)</a:t>
+                        <a:t> (Il est conseillé d’y ajouter un mot-clé)</a:t>
                       </a:r>
                     </a:p>
                     <a:p>

</xml_diff>